<commit_message>
Updated images and formating
</commit_message>
<xml_diff>
--- a/Presentation.pptx
+++ b/Presentation.pptx
@@ -13351,7 +13351,7 @@
       </p:sp>
       <p:pic>
         <p:nvPicPr>
-          <p:cNvPr id="8" name="Picture Placeholder 7" descr="A screenshot of a graph&#10;&#10;Description automatically generated">
+          <p:cNvPr id="8" name="Picture Placeholder 7">
             <a:extLst>
               <a:ext uri="{FF2B5EF4-FFF2-40B4-BE49-F238E27FC236}">
                 <a16:creationId xmlns:a16="http://schemas.microsoft.com/office/drawing/2014/main" id="{1EBC9A9B-46A8-4AFB-BC4C-E29F8F630FE7}"/>
@@ -13367,7 +13367,7 @@
         </p:nvPicPr>
         <p:blipFill rotWithShape="1">
           <a:blip r:embed="rId3"/>
-          <a:srcRect l="-40" r="53"/>
+          <a:srcRect l="6" r="6"/>
           <a:stretch/>
         </p:blipFill>
         <p:spPr>
@@ -14797,6 +14797,35 @@
 </file>
 
 <file path=customXml/item1.xml><?xml version="1.0" encoding="utf-8"?>
+<p:properties xmlns:p="http://schemas.microsoft.com/office/2006/metadata/properties" xmlns:xsi="http://www.w3.org/2001/XMLSchema-instance" xmlns:pc="http://schemas.microsoft.com/office/infopath/2007/PartnerControls">
+  <documentManagement>
+    <_ip_UnifiedCompliancePolicyUIAction xmlns="http://schemas.microsoft.com/sharepoint/v3" xsi:nil="true"/>
+    <Image xmlns="71af3243-3dd4-4a8d-8c0d-dd76da1f02a5">
+      <Url xsi:nil="true"/>
+      <Description xsi:nil="true"/>
+    </Image>
+    <Status xmlns="71af3243-3dd4-4a8d-8c0d-dd76da1f02a5">Not started</Status>
+    <Background xmlns="71af3243-3dd4-4a8d-8c0d-dd76da1f02a5">false</Background>
+    <_ip_UnifiedCompliancePolicyProperties xmlns="http://schemas.microsoft.com/sharepoint/v3" xsi:nil="true"/>
+    <ImageTagsTaxHTField xmlns="71af3243-3dd4-4a8d-8c0d-dd76da1f02a5">
+      <Terms xmlns="http://schemas.microsoft.com/office/infopath/2007/PartnerControls"/>
+    </ImageTagsTaxHTField>
+    <TaxCatchAll xmlns="230e9df3-be65-4c73-a93b-d1236ebd677e" xsi:nil="true"/>
+    <MediaServiceKeyPoints xmlns="71af3243-3dd4-4a8d-8c0d-dd76da1f02a5" xsi:nil="true"/>
+  </documentManagement>
+</p:properties>
+</file>
+
+<file path=customXml/item2.xml><?xml version="1.0" encoding="utf-8"?>
+<?mso-contentType ?>
+<FormTemplates xmlns="http://schemas.microsoft.com/sharepoint/v3/contenttype/forms">
+  <Display>DocumentLibraryForm</Display>
+  <Edit>DocumentLibraryForm</Edit>
+  <New>DocumentLibraryForm</New>
+</FormTemplates>
+</file>
+
+<file path=customXml/item3.xml><?xml version="1.0" encoding="utf-8"?>
 <ct:contentTypeSchema xmlns:ct="http://schemas.microsoft.com/office/2006/metadata/contentType" xmlns:ma="http://schemas.microsoft.com/office/2006/metadata/properties/metaAttributes" ct:_="" ma:_="" ma:contentTypeName="Document" ma:contentTypeID="0x01010079F111ED35F8CC479449609E8A0923A6" ma:contentTypeVersion="28" ma:contentTypeDescription="Create a new document." ma:contentTypeScope="" ma:versionID="60f5a4f2d2b0abadcf532d48ebf9cb71">
   <xsd:schema xmlns:xsd="http://www.w3.org/2001/XMLSchema" xmlns:xs="http://www.w3.org/2001/XMLSchema" xmlns:p="http://schemas.microsoft.com/office/2006/metadata/properties" xmlns:ns1="http://schemas.microsoft.com/sharepoint/v3" xmlns:ns2="71af3243-3dd4-4a8d-8c0d-dd76da1f02a5" xmlns:ns3="16c05727-aa75-4e4a-9b5f-8a80a1165891" xmlns:ns4="230e9df3-be65-4c73-a93b-d1236ebd677e" targetNamespace="http://schemas.microsoft.com/office/2006/metadata/properties" ma:root="true" ma:fieldsID="7dd78129e6a1811f84807ad11c651531" ns1:_="" ns2:_="" ns3:_="" ns4:_="">
     <xsd:import namespace="http://schemas.microsoft.com/sharepoint/v3"/>
@@ -15108,36 +15137,27 @@
 </ct:contentTypeSchema>
 </file>
 
-<file path=customXml/item2.xml><?xml version="1.0" encoding="utf-8"?>
-<?mso-contentType ?>
-<FormTemplates xmlns="http://schemas.microsoft.com/sharepoint/v3/contenttype/forms">
-  <Display>DocumentLibraryForm</Display>
-  <Edit>DocumentLibraryForm</Edit>
-  <New>DocumentLibraryForm</New>
-</FormTemplates>
+<file path=customXml/itemProps1.xml><?xml version="1.0" encoding="utf-8"?>
+<ds:datastoreItem xmlns:ds="http://schemas.openxmlformats.org/officeDocument/2006/customXml" ds:itemID="{57FF477C-132F-44F8-8C56-EBFF95FAF97B}">
+  <ds:schemaRefs>
+    <ds:schemaRef ds:uri="http://schemas.microsoft.com/office/2006/metadata/properties"/>
+    <ds:schemaRef ds:uri="http://schemas.microsoft.com/office/infopath/2007/PartnerControls"/>
+    <ds:schemaRef ds:uri="http://schemas.microsoft.com/sharepoint/v3"/>
+    <ds:schemaRef ds:uri="71af3243-3dd4-4a8d-8c0d-dd76da1f02a5"/>
+    <ds:schemaRef ds:uri="230e9df3-be65-4c73-a93b-d1236ebd677e"/>
+  </ds:schemaRefs>
+</ds:datastoreItem>
 </file>
 
-<file path=customXml/item3.xml><?xml version="1.0" encoding="utf-8"?>
-<p:properties xmlns:p="http://schemas.microsoft.com/office/2006/metadata/properties" xmlns:xsi="http://www.w3.org/2001/XMLSchema-instance" xmlns:pc="http://schemas.microsoft.com/office/infopath/2007/PartnerControls">
-  <documentManagement>
-    <_ip_UnifiedCompliancePolicyUIAction xmlns="http://schemas.microsoft.com/sharepoint/v3" xsi:nil="true"/>
-    <Image xmlns="71af3243-3dd4-4a8d-8c0d-dd76da1f02a5">
-      <Url xsi:nil="true"/>
-      <Description xsi:nil="true"/>
-    </Image>
-    <Status xmlns="71af3243-3dd4-4a8d-8c0d-dd76da1f02a5">Not started</Status>
-    <Background xmlns="71af3243-3dd4-4a8d-8c0d-dd76da1f02a5">false</Background>
-    <_ip_UnifiedCompliancePolicyProperties xmlns="http://schemas.microsoft.com/sharepoint/v3" xsi:nil="true"/>
-    <ImageTagsTaxHTField xmlns="71af3243-3dd4-4a8d-8c0d-dd76da1f02a5">
-      <Terms xmlns="http://schemas.microsoft.com/office/infopath/2007/PartnerControls"/>
-    </ImageTagsTaxHTField>
-    <TaxCatchAll xmlns="230e9df3-be65-4c73-a93b-d1236ebd677e" xsi:nil="true"/>
-    <MediaServiceKeyPoints xmlns="71af3243-3dd4-4a8d-8c0d-dd76da1f02a5" xsi:nil="true"/>
-  </documentManagement>
-</p:properties>
+<file path=customXml/itemProps2.xml><?xml version="1.0" encoding="utf-8"?>
+<ds:datastoreItem xmlns:ds="http://schemas.openxmlformats.org/officeDocument/2006/customXml" ds:itemID="{6F36CB81-A037-44A8-88EB-C0C0F17FD4B1}">
+  <ds:schemaRefs>
+    <ds:schemaRef ds:uri="http://schemas.microsoft.com/sharepoint/v3/contenttype/forms"/>
+  </ds:schemaRefs>
+</ds:datastoreItem>
 </file>
 
-<file path=customXml/itemProps1.xml><?xml version="1.0" encoding="utf-8"?>
+<file path=customXml/itemProps3.xml><?xml version="1.0" encoding="utf-8"?>
 <ds:datastoreItem xmlns:ds="http://schemas.openxmlformats.org/officeDocument/2006/customXml" ds:itemID="{2C1AA24C-4CA6-40FF-8947-DA1F6F47456C}">
   <ds:schemaRefs>
     <ds:schemaRef ds:uri="http://schemas.microsoft.com/office/2006/metadata/contentType"/>
@@ -15158,26 +15178,6 @@
 </ds:datastoreItem>
 </file>
 
-<file path=customXml/itemProps2.xml><?xml version="1.0" encoding="utf-8"?>
-<ds:datastoreItem xmlns:ds="http://schemas.openxmlformats.org/officeDocument/2006/customXml" ds:itemID="{6F36CB81-A037-44A8-88EB-C0C0F17FD4B1}">
-  <ds:schemaRefs>
-    <ds:schemaRef ds:uri="http://schemas.microsoft.com/sharepoint/v3/contenttype/forms"/>
-  </ds:schemaRefs>
-</ds:datastoreItem>
-</file>
-
-<file path=customXml/itemProps3.xml><?xml version="1.0" encoding="utf-8"?>
-<ds:datastoreItem xmlns:ds="http://schemas.openxmlformats.org/officeDocument/2006/customXml" ds:itemID="{57FF477C-132F-44F8-8C56-EBFF95FAF97B}">
-  <ds:schemaRefs>
-    <ds:schemaRef ds:uri="http://schemas.microsoft.com/office/2006/metadata/properties"/>
-    <ds:schemaRef ds:uri="http://schemas.microsoft.com/office/infopath/2007/PartnerControls"/>
-    <ds:schemaRef ds:uri="http://schemas.microsoft.com/sharepoint/v3"/>
-    <ds:schemaRef ds:uri="71af3243-3dd4-4a8d-8c0d-dd76da1f02a5"/>
-    <ds:schemaRef ds:uri="230e9df3-be65-4c73-a93b-d1236ebd677e"/>
-  </ds:schemaRefs>
-</ds:datastoreItem>
-</file>
-
 <file path=docMetadata/LabelInfo.xml><?xml version="1.0" encoding="utf-8"?>
 <clbl:labelList xmlns:clbl="http://schemas.microsoft.com/office/2020/mipLabelMetadata"/>
 </file>
</xml_diff>